<commit_message>
Added new lecture and edited some examples
</commit_message>
<xml_diff>
--- a/BootstrapLectures/Presentations/Bootstrap – using classes.pptx
+++ b/BootstrapLectures/Presentations/Bootstrap – using classes.pptx
@@ -10230,26 +10230,20 @@
           <a:lstStyle/>
           <a:p>
             <a:r>
-              <a:rPr lang="en-US" sz="2400" dirty="0" smtClean="0"/>
-              <a:t>Lead body copy - </a:t>
-            </a:r>
-            <a:r>
               <a:rPr lang="en-US" sz="2400" dirty="0" smtClean="0">
                 <a:solidFill>
-                  <a:srgbClr val="E54C3B"/>
-                </a:solidFill>
-              </a:rPr>
-              <a:t>.lead</a:t>
-            </a:r>
-          </a:p>
-          <a:p>
+                  <a:srgbClr val="2C3E50"/>
+                </a:solidFill>
+              </a:rPr>
+              <a:t>Small </a:t>
+            </a:r>
             <a:r>
               <a:rPr lang="en-US" sz="2400" dirty="0" smtClean="0">
                 <a:solidFill>
                   <a:srgbClr val="2C3E50"/>
                 </a:solidFill>
               </a:rPr>
-              <a:t>Marked text - </a:t>
+              <a:t>text - </a:t>
             </a:r>
             <a:r>
               <a:rPr lang="en-US" sz="2400" dirty="0" smtClean="0">
@@ -10257,43 +10251,7 @@
                   <a:srgbClr val="E54C3B"/>
                 </a:solidFill>
               </a:rPr>
-              <a:t>&lt;mark&gt;</a:t>
-            </a:r>
-          </a:p>
-          <a:p>
-            <a:r>
-              <a:rPr lang="en-US" sz="2400" dirty="0" smtClean="0">
-                <a:solidFill>
-                  <a:srgbClr val="2C3E50"/>
-                </a:solidFill>
-              </a:rPr>
-              <a:t>Deleted text - </a:t>
-            </a:r>
-            <a:r>
-              <a:rPr lang="en-US" sz="2400" dirty="0" smtClean="0">
-                <a:solidFill>
-                  <a:srgbClr val="E54C3B"/>
-                </a:solidFill>
-              </a:rPr>
-              <a:t>&lt;del&gt;</a:t>
-            </a:r>
-          </a:p>
-          <a:p>
-            <a:r>
-              <a:rPr lang="en-US" sz="2400" dirty="0" smtClean="0">
-                <a:solidFill>
-                  <a:srgbClr val="2C3E50"/>
-                </a:solidFill>
-              </a:rPr>
-              <a:t>Strikethrough text - </a:t>
-            </a:r>
-            <a:r>
-              <a:rPr lang="en-US" sz="2400" dirty="0" smtClean="0">
-                <a:solidFill>
-                  <a:srgbClr val="E54C3B"/>
-                </a:solidFill>
-              </a:rPr>
-              <a:t>&lt;s&gt;</a:t>
+              <a:t>&lt;small&gt;</a:t>
             </a:r>
             <a:endParaRPr lang="en-US" sz="2400" dirty="0" smtClean="0">
               <a:solidFill>
@@ -10308,7 +10266,7 @@
                   <a:srgbClr val="2C3E50"/>
                 </a:solidFill>
               </a:rPr>
-              <a:t>Inserted text - </a:t>
+              <a:t>Bold text - </a:t>
             </a:r>
             <a:r>
               <a:rPr lang="en-US" sz="2400" dirty="0" smtClean="0">
@@ -10316,110 +10274,18 @@
                   <a:srgbClr val="E54C3B"/>
                 </a:solidFill>
               </a:rPr>
-              <a:t>&lt;ins&gt;</a:t>
-            </a:r>
-            <a:endParaRPr lang="en-US" sz="2400" dirty="0" smtClean="0">
-              <a:solidFill>
-                <a:srgbClr val="2C3E50"/>
-              </a:solidFill>
-            </a:endParaRPr>
-          </a:p>
-          <a:p>
-            <a:r>
-              <a:rPr lang="en-US" sz="2400" dirty="0" smtClean="0">
-                <a:solidFill>
-                  <a:srgbClr val="2C3E50"/>
-                </a:solidFill>
-              </a:rPr>
-              <a:t>Underlined text - </a:t>
-            </a:r>
-            <a:r>
-              <a:rPr lang="en-US" sz="2400" dirty="0" smtClean="0">
-                <a:solidFill>
-                  <a:srgbClr val="E54C3B"/>
-                </a:solidFill>
-              </a:rPr>
-              <a:t>&lt;u&gt;</a:t>
-            </a:r>
-            <a:endParaRPr lang="en-US" sz="2400" dirty="0" smtClean="0">
-              <a:solidFill>
-                <a:srgbClr val="2C3E50"/>
-              </a:solidFill>
-            </a:endParaRPr>
-          </a:p>
-          <a:p>
-            <a:r>
-              <a:rPr lang="en-US" sz="2400" dirty="0" smtClean="0">
-                <a:solidFill>
-                  <a:srgbClr val="2C3E50"/>
-                </a:solidFill>
-              </a:rPr>
-              <a:t>Small text - </a:t>
-            </a:r>
-            <a:r>
-              <a:rPr lang="en-US" sz="2400" dirty="0" smtClean="0">
-                <a:solidFill>
-                  <a:srgbClr val="E54C3B"/>
-                </a:solidFill>
-              </a:rPr>
-              <a:t>&lt;small&gt;</a:t>
-            </a:r>
-            <a:endParaRPr lang="en-US" sz="2400" dirty="0" smtClean="0">
-              <a:solidFill>
-                <a:srgbClr val="2C3E50"/>
-              </a:solidFill>
-            </a:endParaRPr>
-          </a:p>
-          <a:p>
-            <a:r>
-              <a:rPr lang="en-US" sz="2400" dirty="0" smtClean="0">
-                <a:solidFill>
-                  <a:srgbClr val="2C3E50"/>
-                </a:solidFill>
-              </a:rPr>
-              <a:t>Bold text - </a:t>
-            </a:r>
-            <a:r>
-              <a:rPr lang="en-US" sz="2400" dirty="0" smtClean="0">
-                <a:solidFill>
-                  <a:srgbClr val="E54C3B"/>
-                </a:solidFill>
-              </a:rPr>
-              <a:t>&lt;strong&gt;</a:t>
-            </a:r>
-            <a:endParaRPr lang="en-US" sz="2400" dirty="0" smtClean="0">
-              <a:solidFill>
-                <a:srgbClr val="2C3E50"/>
-              </a:solidFill>
-            </a:endParaRPr>
-          </a:p>
-          <a:p>
-            <a:r>
-              <a:rPr lang="en-US" sz="2400" dirty="0" smtClean="0">
-                <a:solidFill>
-                  <a:srgbClr val="2C3E50"/>
-                </a:solidFill>
-              </a:rPr>
-              <a:t>Italic text - </a:t>
-            </a:r>
-            <a:r>
-              <a:rPr lang="en-US" sz="2400" dirty="0" smtClean="0">
-                <a:solidFill>
-                  <a:srgbClr val="E54C3B"/>
-                </a:solidFill>
-              </a:rPr>
               <a:t>&lt;</a:t>
             </a:r>
             <a:r>
-              <a:rPr lang="en-US" sz="2400" dirty="0" err="1" smtClean="0">
-                <a:solidFill>
-                  <a:srgbClr val="E54C3B"/>
-                </a:solidFill>
-              </a:rPr>
-              <a:t>em</a:t>
-            </a:r>
-            <a:r>
-              <a:rPr lang="en-US" sz="2400" dirty="0" smtClean="0">
+              <a:rPr lang="en-US" sz="2400" smtClean="0">
+                <a:solidFill>
+                  <a:srgbClr val="E54C3B"/>
+                </a:solidFill>
+              </a:rPr>
+              <a:t>strong</a:t>
+            </a:r>
+            <a:r>
+              <a:rPr lang="en-US" sz="2400" smtClean="0">
                 <a:solidFill>
                   <a:srgbClr val="E54C3B"/>
                 </a:solidFill>

</xml_diff>